<commit_message>
Final version of powerpoint
</commit_message>
<xml_diff>
--- a/Firewatch_Presentation.pptx
+++ b/Firewatch_Presentation.pptx
@@ -5,32 +5,34 @@
     <p:sldMasterId id="2147483659" r:id="rId1"/>
   </p:sldMasterIdLst>
   <p:notesMasterIdLst>
-    <p:notesMasterId r:id="rId13"/>
+    <p:notesMasterId r:id="rId15"/>
   </p:notesMasterIdLst>
   <p:sldIdLst>
     <p:sldId id="256" r:id="rId2"/>
     <p:sldId id="260" r:id="rId3"/>
     <p:sldId id="261" r:id="rId4"/>
     <p:sldId id="270" r:id="rId5"/>
-    <p:sldId id="262" r:id="rId6"/>
+    <p:sldId id="272" r:id="rId6"/>
     <p:sldId id="263" r:id="rId7"/>
-    <p:sldId id="268" r:id="rId8"/>
-    <p:sldId id="264" r:id="rId9"/>
-    <p:sldId id="266" r:id="rId10"/>
-    <p:sldId id="267" r:id="rId11"/>
-    <p:sldId id="269" r:id="rId12"/>
+    <p:sldId id="262" r:id="rId8"/>
+    <p:sldId id="271" r:id="rId9"/>
+    <p:sldId id="268" r:id="rId10"/>
+    <p:sldId id="264" r:id="rId11"/>
+    <p:sldId id="266" r:id="rId12"/>
+    <p:sldId id="267" r:id="rId13"/>
+    <p:sldId id="269" r:id="rId14"/>
   </p:sldIdLst>
   <p:sldSz cx="9144000" cy="5143500" type="screen16x9"/>
   <p:notesSz cx="6858000" cy="9144000"/>
   <p:embeddedFontLst>
     <p:embeddedFont>
       <p:font typeface="Average" panose="02000503040000020003" pitchFamily="2" charset="77"/>
-      <p:regular r:id="rId14"/>
+      <p:regular r:id="rId16"/>
     </p:embeddedFont>
     <p:embeddedFont>
       <p:font typeface="Oswald" pitchFamily="2" charset="77"/>
-      <p:regular r:id="rId15"/>
-      <p:bold r:id="rId16"/>
+      <p:regular r:id="rId17"/>
+      <p:bold r:id="rId18"/>
     </p:embeddedFont>
   </p:embeddedFontLst>
   <p:defaultTextStyle>
@@ -1143,6 +1145,110 @@
   <p:cSld>
     <p:spTree>
       <p:nvGrpSpPr>
+        <p:cNvPr id="1" name="Shape 99"/>
+        <p:cNvGrpSpPr/>
+        <p:nvPr/>
+      </p:nvGrpSpPr>
+      <p:grpSpPr>
+        <a:xfrm>
+          <a:off x="0" y="0"/>
+          <a:ext cx="0" cy="0"/>
+          <a:chOff x="0" y="0"/>
+          <a:chExt cx="0" cy="0"/>
+        </a:xfrm>
+      </p:grpSpPr>
+      <p:sp>
+        <p:nvSpPr>
+          <p:cNvPr id="100" name="Google Shape;100;ga84bc6c75e_0_15:notes"/>
+          <p:cNvSpPr>
+            <a:spLocks noGrp="1" noRot="1" noChangeAspect="1"/>
+          </p:cNvSpPr>
+          <p:nvPr>
+            <p:ph type="sldImg" idx="2"/>
+          </p:nvPr>
+        </p:nvSpPr>
+        <p:spPr>
+          <a:xfrm>
+            <a:off x="381000" y="685800"/>
+            <a:ext cx="6096000" cy="3429000"/>
+          </a:xfrm>
+          <a:custGeom>
+            <a:avLst/>
+            <a:gdLst/>
+            <a:ahLst/>
+            <a:cxnLst/>
+            <a:rect l="l" t="t" r="r" b="b"/>
+            <a:pathLst>
+              <a:path w="120000" h="120000" extrusionOk="0">
+                <a:moveTo>
+                  <a:pt x="0" y="0"/>
+                </a:moveTo>
+                <a:lnTo>
+                  <a:pt x="120000" y="0"/>
+                </a:lnTo>
+                <a:lnTo>
+                  <a:pt x="120000" y="120000"/>
+                </a:lnTo>
+                <a:lnTo>
+                  <a:pt x="0" y="120000"/>
+                </a:lnTo>
+                <a:close/>
+              </a:path>
+            </a:pathLst>
+          </a:custGeom>
+        </p:spPr>
+      </p:sp>
+      <p:sp>
+        <p:nvSpPr>
+          <p:cNvPr id="101" name="Google Shape;101;ga84bc6c75e_0_15:notes"/>
+          <p:cNvSpPr txBox="1">
+            <a:spLocks noGrp="1"/>
+          </p:cNvSpPr>
+          <p:nvPr>
+            <p:ph type="body" idx="1"/>
+          </p:nvPr>
+        </p:nvSpPr>
+        <p:spPr>
+          <a:xfrm>
+            <a:off x="685800" y="4343400"/>
+            <a:ext cx="5486400" cy="4114800"/>
+          </a:xfrm>
+          <a:prstGeom prst="rect">
+            <a:avLst/>
+          </a:prstGeom>
+        </p:spPr>
+        <p:txBody>
+          <a:bodyPr spcFirstLastPara="1" wrap="square" lIns="91425" tIns="91425" rIns="91425" bIns="91425" anchor="t" anchorCtr="0">
+            <a:noAutofit/>
+          </a:bodyPr>
+          <a:lstStyle/>
+          <a:p>
+            <a:pPr marL="0" lvl="0" indent="0" algn="l" rtl="0">
+              <a:spcBef>
+                <a:spcPts val="0"/>
+              </a:spcBef>
+              <a:spcAft>
+                <a:spcPts val="0"/>
+              </a:spcAft>
+              <a:buNone/>
+            </a:pPr>
+            <a:endParaRPr/>
+          </a:p>
+        </p:txBody>
+      </p:sp>
+    </p:spTree>
+  </p:cSld>
+  <p:clrMapOvr>
+    <a:masterClrMapping/>
+  </p:clrMapOvr>
+</p:notes>
+</file>
+
+<file path=ppt/notesSlides/notesSlide5.xml><?xml version="1.0" encoding="utf-8"?>
+<p:notes xmlns:a="http://schemas.openxmlformats.org/drawingml/2006/main" xmlns:r="http://schemas.openxmlformats.org/officeDocument/2006/relationships" xmlns:p="http://schemas.openxmlformats.org/presentationml/2006/main" showMasterSp="0" showMasterPhAnim="0">
+  <p:cSld>
+    <p:spTree>
+      <p:nvGrpSpPr>
         <p:cNvPr id="1" name="Shape 93"/>
         <p:cNvGrpSpPr/>
         <p:nvPr/>
@@ -1230,111 +1336,7 @@
               </a:spcAft>
               <a:buNone/>
             </a:pPr>
-            <a:endParaRPr/>
-          </a:p>
-        </p:txBody>
-      </p:sp>
-    </p:spTree>
-  </p:cSld>
-  <p:clrMapOvr>
-    <a:masterClrMapping/>
-  </p:clrMapOvr>
-</p:notes>
-</file>
-
-<file path=ppt/notesSlides/notesSlide5.xml><?xml version="1.0" encoding="utf-8"?>
-<p:notes xmlns:a="http://schemas.openxmlformats.org/drawingml/2006/main" xmlns:r="http://schemas.openxmlformats.org/officeDocument/2006/relationships" xmlns:p="http://schemas.openxmlformats.org/presentationml/2006/main" showMasterSp="0" showMasterPhAnim="0">
-  <p:cSld>
-    <p:spTree>
-      <p:nvGrpSpPr>
-        <p:cNvPr id="1" name="Shape 99"/>
-        <p:cNvGrpSpPr/>
-        <p:nvPr/>
-      </p:nvGrpSpPr>
-      <p:grpSpPr>
-        <a:xfrm>
-          <a:off x="0" y="0"/>
-          <a:ext cx="0" cy="0"/>
-          <a:chOff x="0" y="0"/>
-          <a:chExt cx="0" cy="0"/>
-        </a:xfrm>
-      </p:grpSpPr>
-      <p:sp>
-        <p:nvSpPr>
-          <p:cNvPr id="100" name="Google Shape;100;ga84bc6c75e_0_15:notes"/>
-          <p:cNvSpPr>
-            <a:spLocks noGrp="1" noRot="1" noChangeAspect="1"/>
-          </p:cNvSpPr>
-          <p:nvPr>
-            <p:ph type="sldImg" idx="2"/>
-          </p:nvPr>
-        </p:nvSpPr>
-        <p:spPr>
-          <a:xfrm>
-            <a:off x="381000" y="685800"/>
-            <a:ext cx="6096000" cy="3429000"/>
-          </a:xfrm>
-          <a:custGeom>
-            <a:avLst/>
-            <a:gdLst/>
-            <a:ahLst/>
-            <a:cxnLst/>
-            <a:rect l="l" t="t" r="r" b="b"/>
-            <a:pathLst>
-              <a:path w="120000" h="120000" extrusionOk="0">
-                <a:moveTo>
-                  <a:pt x="0" y="0"/>
-                </a:moveTo>
-                <a:lnTo>
-                  <a:pt x="120000" y="0"/>
-                </a:lnTo>
-                <a:lnTo>
-                  <a:pt x="120000" y="120000"/>
-                </a:lnTo>
-                <a:lnTo>
-                  <a:pt x="0" y="120000"/>
-                </a:lnTo>
-                <a:close/>
-              </a:path>
-            </a:pathLst>
-          </a:custGeom>
-        </p:spPr>
-      </p:sp>
-      <p:sp>
-        <p:nvSpPr>
-          <p:cNvPr id="101" name="Google Shape;101;ga84bc6c75e_0_15:notes"/>
-          <p:cNvSpPr txBox="1">
-            <a:spLocks noGrp="1"/>
-          </p:cNvSpPr>
-          <p:nvPr>
-            <p:ph type="body" idx="1"/>
-          </p:nvPr>
-        </p:nvSpPr>
-        <p:spPr>
-          <a:xfrm>
-            <a:off x="685800" y="4343400"/>
-            <a:ext cx="5486400" cy="4114800"/>
-          </a:xfrm>
-          <a:prstGeom prst="rect">
-            <a:avLst/>
-          </a:prstGeom>
-        </p:spPr>
-        <p:txBody>
-          <a:bodyPr spcFirstLastPara="1" wrap="square" lIns="91425" tIns="91425" rIns="91425" bIns="91425" anchor="t" anchorCtr="0">
-            <a:noAutofit/>
-          </a:bodyPr>
-          <a:lstStyle/>
-          <a:p>
-            <a:pPr marL="0" lvl="0" indent="0" algn="l" rtl="0">
-              <a:spcBef>
-                <a:spcPts val="0"/>
-              </a:spcBef>
-              <a:spcAft>
-                <a:spcPts val="0"/>
-              </a:spcAft>
-              <a:buNone/>
-            </a:pPr>
-            <a:endParaRPr/>
+            <a:endParaRPr dirty="0"/>
           </a:p>
         </p:txBody>
       </p:sp>
@@ -1438,7 +1440,7 @@
               </a:spcAft>
               <a:buNone/>
             </a:pPr>
-            <a:endParaRPr/>
+            <a:endParaRPr dirty="0"/>
           </a:p>
         </p:txBody>
       </p:sp>
@@ -7216,6 +7218,226 @@
   <p:cSld>
     <p:spTree>
       <p:nvGrpSpPr>
+        <p:cNvPr id="1" name="Shape 108"/>
+        <p:cNvGrpSpPr/>
+        <p:nvPr/>
+      </p:nvGrpSpPr>
+      <p:grpSpPr>
+        <a:xfrm>
+          <a:off x="0" y="0"/>
+          <a:ext cx="0" cy="0"/>
+          <a:chOff x="0" y="0"/>
+          <a:chExt cx="0" cy="0"/>
+        </a:xfrm>
+      </p:grpSpPr>
+      <p:sp>
+        <p:nvSpPr>
+          <p:cNvPr id="109" name="Google Shape;109;p21"/>
+          <p:cNvSpPr txBox="1">
+            <a:spLocks noGrp="1"/>
+          </p:cNvSpPr>
+          <p:nvPr>
+            <p:ph type="title"/>
+          </p:nvPr>
+        </p:nvSpPr>
+        <p:spPr>
+          <a:prstGeom prst="rect">
+            <a:avLst/>
+          </a:prstGeom>
+        </p:spPr>
+        <p:txBody>
+          <a:bodyPr spcFirstLastPara="1" wrap="square" lIns="91425" tIns="91425" rIns="91425" bIns="91425" anchor="t" anchorCtr="0">
+            <a:noAutofit/>
+          </a:bodyPr>
+          <a:lstStyle/>
+          <a:p>
+            <a:pPr marL="0" lvl="0" indent="0" algn="l" rtl="0">
+              <a:spcBef>
+                <a:spcPts val="0"/>
+              </a:spcBef>
+              <a:spcAft>
+                <a:spcPts val="0"/>
+              </a:spcAft>
+              <a:buNone/>
+            </a:pPr>
+            <a:r>
+              <a:rPr lang="en" dirty="0"/>
+              <a:t>U.S. Wildfire Size Classification Scenarios</a:t>
+            </a:r>
+            <a:endParaRPr dirty="0"/>
+          </a:p>
+        </p:txBody>
+      </p:sp>
+      <p:pic>
+        <p:nvPicPr>
+          <p:cNvPr id="4" name="Picture 3" descr="Chart, bar chart&#10;&#10;Description automatically generated">
+            <a:extLst>
+              <a:ext uri="{FF2B5EF4-FFF2-40B4-BE49-F238E27FC236}">
+                <a16:creationId xmlns:a16="http://schemas.microsoft.com/office/drawing/2014/main" id="{E5B46531-D948-B048-9629-B1848AE27866}"/>
+              </a:ext>
+            </a:extLst>
+          </p:cNvPr>
+          <p:cNvPicPr>
+            <a:picLocks noChangeAspect="1"/>
+          </p:cNvPicPr>
+          <p:nvPr/>
+        </p:nvPicPr>
+        <p:blipFill>
+          <a:blip r:embed="rId3"/>
+          <a:stretch>
+            <a:fillRect/>
+          </a:stretch>
+        </p:blipFill>
+        <p:spPr>
+          <a:xfrm>
+            <a:off x="1750440" y="1017725"/>
+            <a:ext cx="5643119" cy="3909875"/>
+          </a:xfrm>
+          <a:prstGeom prst="rect">
+            <a:avLst/>
+          </a:prstGeom>
+        </p:spPr>
+      </p:pic>
+    </p:spTree>
+  </p:cSld>
+  <p:clrMapOvr>
+    <a:masterClrMapping/>
+  </p:clrMapOvr>
+</p:sld>
+</file>
+
+<file path=ppt/slides/slide11.xml><?xml version="1.0" encoding="utf-8"?>
+<p:sld xmlns:a="http://schemas.openxmlformats.org/drawingml/2006/main" xmlns:r="http://schemas.openxmlformats.org/officeDocument/2006/relationships" xmlns:p="http://schemas.openxmlformats.org/presentationml/2006/main">
+  <p:cSld>
+    <p:spTree>
+      <p:nvGrpSpPr>
+        <p:cNvPr id="1" name="Shape 120"/>
+        <p:cNvGrpSpPr/>
+        <p:nvPr/>
+      </p:nvGrpSpPr>
+      <p:grpSpPr>
+        <a:xfrm>
+          <a:off x="0" y="0"/>
+          <a:ext cx="0" cy="0"/>
+          <a:chOff x="0" y="0"/>
+          <a:chExt cx="0" cy="0"/>
+        </a:xfrm>
+      </p:grpSpPr>
+      <p:sp>
+        <p:nvSpPr>
+          <p:cNvPr id="121" name="Google Shape;121;p23"/>
+          <p:cNvSpPr txBox="1">
+            <a:spLocks noGrp="1"/>
+          </p:cNvSpPr>
+          <p:nvPr>
+            <p:ph type="title"/>
+          </p:nvPr>
+        </p:nvSpPr>
+        <p:spPr>
+          <a:xfrm>
+            <a:off x="311700" y="445025"/>
+            <a:ext cx="8520600" cy="572700"/>
+          </a:xfrm>
+          <a:prstGeom prst="rect">
+            <a:avLst/>
+          </a:prstGeom>
+        </p:spPr>
+        <p:txBody>
+          <a:bodyPr spcFirstLastPara="1" wrap="square" lIns="91425" tIns="91425" rIns="91425" bIns="91425" anchor="t" anchorCtr="0">
+            <a:noAutofit/>
+          </a:bodyPr>
+          <a:lstStyle/>
+          <a:p>
+            <a:pPr marL="0" lvl="0" indent="0" algn="l" rtl="0">
+              <a:spcBef>
+                <a:spcPts val="0"/>
+              </a:spcBef>
+              <a:spcAft>
+                <a:spcPts val="0"/>
+              </a:spcAft>
+              <a:buNone/>
+            </a:pPr>
+            <a:r>
+              <a:rPr lang="en" dirty="0"/>
+              <a:t>U.S. Wildfire Cause Distribution of Year</a:t>
+            </a:r>
+            <a:endParaRPr dirty="0"/>
+          </a:p>
+        </p:txBody>
+      </p:sp>
+      <p:pic>
+        <p:nvPicPr>
+          <p:cNvPr id="7" name="Picture 6" descr="Chart, pie chart&#10;&#10;Description automatically generated">
+            <a:extLst>
+              <a:ext uri="{FF2B5EF4-FFF2-40B4-BE49-F238E27FC236}">
+                <a16:creationId xmlns:a16="http://schemas.microsoft.com/office/drawing/2014/main" id="{47B96223-20C2-2C49-960B-E52C562EECF2}"/>
+              </a:ext>
+            </a:extLst>
+          </p:cNvPr>
+          <p:cNvPicPr>
+            <a:picLocks noChangeAspect="1"/>
+          </p:cNvPicPr>
+          <p:nvPr/>
+        </p:nvPicPr>
+        <p:blipFill>
+          <a:blip r:embed="rId3"/>
+          <a:stretch>
+            <a:fillRect/>
+          </a:stretch>
+        </p:blipFill>
+        <p:spPr>
+          <a:xfrm>
+            <a:off x="149606" y="1709928"/>
+            <a:ext cx="3611211" cy="2011680"/>
+          </a:xfrm>
+          <a:prstGeom prst="rect">
+            <a:avLst/>
+          </a:prstGeom>
+        </p:spPr>
+      </p:pic>
+      <p:pic>
+        <p:nvPicPr>
+          <p:cNvPr id="6" name="Picture 5" descr="Chart, funnel chart&#10;&#10;Description automatically generated">
+            <a:extLst>
+              <a:ext uri="{FF2B5EF4-FFF2-40B4-BE49-F238E27FC236}">
+                <a16:creationId xmlns:a16="http://schemas.microsoft.com/office/drawing/2014/main" id="{1B5F9A78-42C4-A944-AC75-214C9E11A6C7}"/>
+              </a:ext>
+            </a:extLst>
+          </p:cNvPr>
+          <p:cNvPicPr>
+            <a:picLocks noChangeAspect="1"/>
+          </p:cNvPicPr>
+          <p:nvPr/>
+        </p:nvPicPr>
+        <p:blipFill>
+          <a:blip r:embed="rId4"/>
+          <a:stretch>
+            <a:fillRect/>
+          </a:stretch>
+        </p:blipFill>
+        <p:spPr>
+          <a:xfrm>
+            <a:off x="3822934" y="1058599"/>
+            <a:ext cx="5171460" cy="3639876"/>
+          </a:xfrm>
+          <a:prstGeom prst="rect">
+            <a:avLst/>
+          </a:prstGeom>
+        </p:spPr>
+      </p:pic>
+    </p:spTree>
+  </p:cSld>
+  <p:clrMapOvr>
+    <a:masterClrMapping/>
+  </p:clrMapOvr>
+</p:sld>
+</file>
+
+<file path=ppt/slides/slide12.xml><?xml version="1.0" encoding="utf-8"?>
+<p:sld xmlns:a="http://schemas.openxmlformats.org/drawingml/2006/main" xmlns:r="http://schemas.openxmlformats.org/officeDocument/2006/relationships" xmlns:p="http://schemas.openxmlformats.org/presentationml/2006/main">
+  <p:cSld>
+    <p:spTree>
+      <p:nvGrpSpPr>
         <p:cNvPr id="1" name="Shape 126"/>
         <p:cNvGrpSpPr/>
         <p:nvPr/>
@@ -7306,24 +7528,7 @@
             </a:pPr>
             <a:r>
               <a:rPr lang="en" dirty="0"/>
-              <a:t>Having interactive application:</a:t>
-            </a:r>
-            <a:endParaRPr dirty="0"/>
-          </a:p>
-          <a:p>
-            <a:pPr marL="457200" lvl="0" indent="-342900" algn="l" rtl="0">
-              <a:spcBef>
-                <a:spcPts val="1600"/>
-              </a:spcBef>
-              <a:spcAft>
-                <a:spcPts val="0"/>
-              </a:spcAft>
-              <a:buSzPts val="1800"/>
-              <a:buChar char="●"/>
-            </a:pPr>
-            <a:r>
-              <a:rPr lang="en" dirty="0"/>
-              <a:t>D3.js</a:t>
+              <a:t>Having interactive features:</a:t>
             </a:r>
             <a:endParaRPr dirty="0"/>
           </a:p>
@@ -7361,7 +7566,7 @@
             </a:r>
             <a:r>
               <a:rPr lang="en" dirty="0"/>
-              <a:t> or Leaflet R package</a:t>
+              <a:t> R package</a:t>
             </a:r>
             <a:endParaRPr dirty="0"/>
           </a:p>
@@ -7459,7 +7664,7 @@
       </p:sp>
       <p:pic>
         <p:nvPicPr>
-          <p:cNvPr id="129" name="Google Shape;129;p24"/>
+          <p:cNvPr id="130" name="Google Shape;130;p24"/>
           <p:cNvPicPr preferRelativeResize="0"/>
           <p:nvPr/>
         </p:nvPicPr>
@@ -7473,8 +7678,8 @@
         </p:blipFill>
         <p:spPr>
           <a:xfrm>
-            <a:off x="5667350" y="1071900"/>
-            <a:ext cx="1695450" cy="1428750"/>
+            <a:off x="3446027" y="1595822"/>
+            <a:ext cx="2251944" cy="529747"/>
           </a:xfrm>
           <a:prstGeom prst="rect">
             <a:avLst/>
@@ -7487,58 +7692,62 @@
       </p:pic>
       <p:pic>
         <p:nvPicPr>
-          <p:cNvPr id="130" name="Google Shape;130;p24"/>
-          <p:cNvPicPr preferRelativeResize="0"/>
+          <p:cNvPr id="3" name="Picture 2">
+            <a:extLst>
+              <a:ext uri="{FF2B5EF4-FFF2-40B4-BE49-F238E27FC236}">
+                <a16:creationId xmlns:a16="http://schemas.microsoft.com/office/drawing/2014/main" id="{BFA75DAE-A394-CB4B-BD22-A8D8F8DB6B9A}"/>
+              </a:ext>
+            </a:extLst>
+          </p:cNvPr>
+          <p:cNvPicPr>
+            <a:picLocks noChangeAspect="1"/>
+          </p:cNvPicPr>
           <p:nvPr/>
         </p:nvPicPr>
         <p:blipFill>
-          <a:blip r:embed="rId4">
-            <a:alphaModFix/>
-          </a:blip>
+          <a:blip r:embed="rId4"/>
           <a:stretch>
             <a:fillRect/>
           </a:stretch>
         </p:blipFill>
         <p:spPr>
           <a:xfrm>
-            <a:off x="4490500" y="3261950"/>
-            <a:ext cx="1950650" cy="398300"/>
+            <a:off x="4758094" y="2796214"/>
+            <a:ext cx="1879755" cy="624395"/>
           </a:xfrm>
           <a:prstGeom prst="rect">
             <a:avLst/>
           </a:prstGeom>
-          <a:noFill/>
-          <a:ln>
-            <a:noFill/>
-          </a:ln>
         </p:spPr>
       </p:pic>
       <p:pic>
         <p:nvPicPr>
-          <p:cNvPr id="131" name="Google Shape;131;p24"/>
-          <p:cNvPicPr preferRelativeResize="0"/>
+          <p:cNvPr id="8" name="Picture 7">
+            <a:extLst>
+              <a:ext uri="{FF2B5EF4-FFF2-40B4-BE49-F238E27FC236}">
+                <a16:creationId xmlns:a16="http://schemas.microsoft.com/office/drawing/2014/main" id="{E605EE95-5295-0B43-8F9F-E7D9F0BAADF7}"/>
+              </a:ext>
+            </a:extLst>
+          </p:cNvPr>
+          <p:cNvPicPr>
+            <a:picLocks noChangeAspect="1"/>
+          </p:cNvPicPr>
           <p:nvPr/>
         </p:nvPicPr>
         <p:blipFill>
-          <a:blip r:embed="rId5">
-            <a:alphaModFix/>
-          </a:blip>
+          <a:blip r:embed="rId5"/>
           <a:stretch>
             <a:fillRect/>
           </a:stretch>
         </p:blipFill>
         <p:spPr>
           <a:xfrm>
-            <a:off x="7042300" y="3261950"/>
-            <a:ext cx="1542500" cy="621600"/>
+            <a:off x="5697972" y="3998706"/>
+            <a:ext cx="3111500" cy="381000"/>
           </a:xfrm>
           <a:prstGeom prst="rect">
             <a:avLst/>
           </a:prstGeom>
-          <a:noFill/>
-          <a:ln>
-            <a:noFill/>
-          </a:ln>
         </p:spPr>
       </p:pic>
     </p:spTree>
@@ -7549,7 +7758,7 @@
 </p:sld>
 </file>
 
-<file path=ppt/slides/slide11.xml><?xml version="1.0" encoding="utf-8"?>
+<file path=ppt/slides/slide13.xml><?xml version="1.0" encoding="utf-8"?>
 <p:sld xmlns:a="http://schemas.openxmlformats.org/drawingml/2006/main" xmlns:r="http://schemas.openxmlformats.org/officeDocument/2006/relationships" xmlns:p="http://schemas.openxmlformats.org/presentationml/2006/main">
   <p:cSld>
     <p:spTree>
@@ -7816,10 +8025,10 @@
               <a:buNone/>
             </a:pPr>
             <a:r>
-              <a:rPr lang="en"/>
+              <a:rPr lang="en" dirty="0"/>
               <a:t>Motivation	</a:t>
             </a:r>
-            <a:endParaRPr/>
+            <a:endParaRPr dirty="0"/>
           </a:p>
           <a:p>
             <a:pPr marL="0" lvl="0" indent="0" algn="l" rtl="0">
@@ -7832,10 +8041,10 @@
               <a:buNone/>
             </a:pPr>
             <a:r>
-              <a:rPr lang="en"/>
+              <a:rPr lang="en" dirty="0"/>
               <a:t>	</a:t>
             </a:r>
-            <a:endParaRPr/>
+            <a:endParaRPr dirty="0"/>
           </a:p>
         </p:txBody>
       </p:sp>
@@ -7851,8 +8060,8 @@
         </p:nvSpPr>
         <p:spPr>
           <a:xfrm>
-            <a:off x="391425" y="1618575"/>
-            <a:ext cx="2525512" cy="3353100"/>
+            <a:off x="391424" y="1455907"/>
+            <a:ext cx="2281437" cy="3353100"/>
           </a:xfrm>
           <a:prstGeom prst="rect">
             <a:avLst/>
@@ -7874,20 +8083,8 @@
               <a:buNone/>
             </a:pPr>
             <a:r>
-              <a:rPr lang="en" dirty="0"/>
-              <a:t>The increasing air pol</a:t>
-            </a:r>
-            <a:r>
-              <a:rPr lang="en-US" dirty="0" err="1"/>
-              <a:t>lu</a:t>
-            </a:r>
-            <a:r>
-              <a:rPr lang="en" dirty="0" err="1"/>
-              <a:t>tion</a:t>
-            </a:r>
-            <a:r>
-              <a:rPr lang="en" dirty="0"/>
-              <a:t> due to wildfires has been one of the most important and prevalent issues within the American public health. </a:t>
+              <a:rPr lang="en-US" dirty="0"/>
+              <a:t>The smoke from wildfires in the western United States, had blanket Colorado’s skies in the past couple month</a:t>
             </a:r>
             <a:endParaRPr dirty="0"/>
           </a:p>
@@ -7915,8 +8112,8 @@
         </p:blipFill>
         <p:spPr>
           <a:xfrm>
-            <a:off x="3252057" y="1023620"/>
-            <a:ext cx="5500519" cy="3096260"/>
+            <a:off x="2795779" y="1047560"/>
+            <a:ext cx="5956797" cy="3353100"/>
           </a:xfrm>
           <a:prstGeom prst="rect">
             <a:avLst/>
@@ -8019,7 +8216,7 @@
         <p:spPr>
           <a:xfrm>
             <a:off x="471174" y="1152475"/>
-            <a:ext cx="2453095" cy="3416400"/>
+            <a:ext cx="2603622" cy="3416400"/>
           </a:xfrm>
           <a:prstGeom prst="rect">
             <a:avLst/>
@@ -8036,7 +8233,7 @@
             </a:pPr>
             <a:r>
               <a:rPr lang="en-US" dirty="0"/>
-              <a:t>How is the wildfire frequency and severity trend over time ?</a:t>
+              <a:t>How are the wildfire frequency and severity trends over time?</a:t>
             </a:r>
           </a:p>
           <a:p>
@@ -8045,17 +8242,24 @@
             </a:pPr>
             <a:r>
               <a:rPr lang="en-US" dirty="0"/>
-              <a:t>Which state is at most risk for wildfire ?</a:t>
+              <a:t>What time of the year has a higher risk due to wildfire?</a:t>
+            </a:r>
+          </a:p>
+          <a:p>
+            <a:pPr marL="342900">
+              <a:buFont typeface="Average"/>
+              <a:buAutoNum type="arabicPeriod"/>
+            </a:pPr>
+            <a:r>
+              <a:rPr lang="en-US" dirty="0"/>
+              <a:t>Which state and county are at most risk for wildfire?</a:t>
             </a:r>
           </a:p>
           <a:p>
             <a:pPr marL="342900" lvl="0">
               <a:buAutoNum type="arabicPeriod"/>
             </a:pPr>
-            <a:r>
-              <a:rPr lang="en-US" dirty="0"/>
-              <a:t>When is the highest risky for wildfire ?</a:t>
-            </a:r>
+            <a:endParaRPr lang="en-US" dirty="0"/>
           </a:p>
         </p:txBody>
       </p:sp>
@@ -8144,10 +8348,10 @@
       </p:sp>
       <p:pic>
         <p:nvPicPr>
-          <p:cNvPr id="5" name="Picture 4">
+          <p:cNvPr id="10" name="Picture 9" descr="Chart, bar chart&#10;&#10;Description automatically generated">
             <a:extLst>
               <a:ext uri="{FF2B5EF4-FFF2-40B4-BE49-F238E27FC236}">
-                <a16:creationId xmlns:a16="http://schemas.microsoft.com/office/drawing/2014/main" id="{A58E0DFE-B9AA-2A4B-9F74-0831E4232049}"/>
+                <a16:creationId xmlns:a16="http://schemas.microsoft.com/office/drawing/2014/main" id="{B5AB3720-9FAB-FD44-A1F0-53EEAE403492}"/>
               </a:ext>
             </a:extLst>
           </p:cNvPr>
@@ -8164,38 +8368,8 @@
         </p:blipFill>
         <p:spPr>
           <a:xfrm>
-            <a:off x="4343767" y="1240315"/>
-            <a:ext cx="4689140" cy="3226177"/>
-          </a:xfrm>
-          <a:prstGeom prst="rect">
-            <a:avLst/>
-          </a:prstGeom>
-        </p:spPr>
-      </p:pic>
-      <p:pic>
-        <p:nvPicPr>
-          <p:cNvPr id="7" name="Picture 6">
-            <a:extLst>
-              <a:ext uri="{FF2B5EF4-FFF2-40B4-BE49-F238E27FC236}">
-                <a16:creationId xmlns:a16="http://schemas.microsoft.com/office/drawing/2014/main" id="{81EF4C5D-1BAF-034E-9B28-76E54EE1FD57}"/>
-              </a:ext>
-            </a:extLst>
-          </p:cNvPr>
-          <p:cNvPicPr>
-            <a:picLocks noChangeAspect="1"/>
-          </p:cNvPicPr>
-          <p:nvPr/>
-        </p:nvPicPr>
-        <p:blipFill>
-          <a:blip r:embed="rId3"/>
-          <a:stretch>
-            <a:fillRect/>
-          </a:stretch>
-        </p:blipFill>
-        <p:spPr>
-          <a:xfrm>
-            <a:off x="111093" y="1240315"/>
-            <a:ext cx="4176346" cy="3226177"/>
+            <a:off x="1892340" y="1042073"/>
+            <a:ext cx="5359319" cy="3676441"/>
           </a:xfrm>
           <a:prstGeom prst="rect">
             <a:avLst/>
@@ -8220,7 +8394,7 @@
   <p:cSld>
     <p:spTree>
       <p:nvGrpSpPr>
-        <p:cNvPr id="1" name="Shape 96"/>
+        <p:cNvPr id="1" name=""/>
         <p:cNvGrpSpPr/>
         <p:nvPr/>
       </p:nvGrpSpPr>
@@ -8234,48 +8408,38 @@
       </p:grpSpPr>
       <p:sp>
         <p:nvSpPr>
-          <p:cNvPr id="97" name="Google Shape;97;p19"/>
-          <p:cNvSpPr txBox="1">
+          <p:cNvPr id="2" name="Title 1">
+            <a:extLst>
+              <a:ext uri="{FF2B5EF4-FFF2-40B4-BE49-F238E27FC236}">
+                <a16:creationId xmlns:a16="http://schemas.microsoft.com/office/drawing/2014/main" id="{2923FB13-CEBF-724D-99F6-03B25356E8EA}"/>
+              </a:ext>
+            </a:extLst>
+          </p:cNvPr>
+          <p:cNvSpPr>
             <a:spLocks noGrp="1"/>
           </p:cNvSpPr>
           <p:nvPr>
             <p:ph type="title"/>
           </p:nvPr>
         </p:nvSpPr>
-        <p:spPr>
-          <a:prstGeom prst="rect">
-            <a:avLst/>
-          </a:prstGeom>
-        </p:spPr>
+        <p:spPr/>
         <p:txBody>
-          <a:bodyPr spcFirstLastPara="1" wrap="square" lIns="91425" tIns="91425" rIns="91425" bIns="91425" anchor="t" anchorCtr="0">
-            <a:noAutofit/>
-          </a:bodyPr>
+          <a:bodyPr/>
           <a:lstStyle/>
           <a:p>
-            <a:pPr marL="0" lvl="0" indent="0" algn="l" rtl="0">
-              <a:spcBef>
-                <a:spcPts val="0"/>
-              </a:spcBef>
-              <a:spcAft>
-                <a:spcPts val="0"/>
-              </a:spcAft>
-              <a:buNone/>
-            </a:pPr>
             <a:r>
-              <a:rPr lang="en" dirty="0"/>
-              <a:t>State Wise U.S. Wildfire Scenarios - The Most Risky Area</a:t>
+              <a:rPr lang="en-US" dirty="0"/>
+              <a:t>U.S. Wildfire Trend from 1992 to 2018 (Cont.)</a:t>
             </a:r>
-            <a:endParaRPr dirty="0"/>
           </a:p>
         </p:txBody>
       </p:sp>
       <p:pic>
         <p:nvPicPr>
-          <p:cNvPr id="3" name="Picture 2" descr="Map&#10;&#10;Description automatically generated">
+          <p:cNvPr id="5" name="Picture 4" descr="Chart, line chart&#10;&#10;Description automatically generated">
             <a:extLst>
               <a:ext uri="{FF2B5EF4-FFF2-40B4-BE49-F238E27FC236}">
-                <a16:creationId xmlns:a16="http://schemas.microsoft.com/office/drawing/2014/main" id="{E2524190-1A1C-0E47-B305-EA7AEB7F4D34}"/>
+                <a16:creationId xmlns:a16="http://schemas.microsoft.com/office/drawing/2014/main" id="{C4A88FE6-9C5C-7A45-9710-33DA2A6D240E}"/>
               </a:ext>
             </a:extLst>
           </p:cNvPr>
@@ -8285,15 +8449,15 @@
           <p:nvPr/>
         </p:nvPicPr>
         <p:blipFill>
-          <a:blip r:embed="rId3"/>
+          <a:blip r:embed="rId2"/>
           <a:stretch>
             <a:fillRect/>
           </a:stretch>
         </p:blipFill>
         <p:spPr>
           <a:xfrm>
-            <a:off x="1650619" y="1154478"/>
-            <a:ext cx="5842762" cy="3508708"/>
+            <a:off x="1885479" y="1087435"/>
+            <a:ext cx="5373042" cy="3788684"/>
           </a:xfrm>
           <a:prstGeom prst="rect">
             <a:avLst/>
@@ -8301,6 +8465,11 @@
         </p:spPr>
       </p:pic>
     </p:spTree>
+    <p:extLst>
+      <p:ext uri="{BB962C8B-B14F-4D97-AF65-F5344CB8AC3E}">
+        <p14:creationId xmlns:p14="http://schemas.microsoft.com/office/powerpoint/2010/main" val="309074747"/>
+      </p:ext>
+    </p:extLst>
   </p:cSld>
   <p:clrMapOvr>
     <a:masterClrMapping/>
@@ -8365,10 +8534,10 @@
       </p:sp>
       <p:pic>
         <p:nvPicPr>
-          <p:cNvPr id="3" name="Picture 2" descr="Chart, line chart, histogram&#10;&#10;Description automatically generated">
+          <p:cNvPr id="6" name="Picture 5" descr="Chart, histogram&#10;&#10;Description automatically generated">
             <a:extLst>
               <a:ext uri="{FF2B5EF4-FFF2-40B4-BE49-F238E27FC236}">
-                <a16:creationId xmlns:a16="http://schemas.microsoft.com/office/drawing/2014/main" id="{6A694511-853B-BE4A-B329-8F7096355C7E}"/>
+                <a16:creationId xmlns:a16="http://schemas.microsoft.com/office/drawing/2014/main" id="{0B7BB313-F82C-BF4D-A99B-0A8E1A56A836}"/>
               </a:ext>
             </a:extLst>
           </p:cNvPr>
@@ -8385,8 +8554,8 @@
         </p:blipFill>
         <p:spPr>
           <a:xfrm>
-            <a:off x="2069846" y="1162823"/>
-            <a:ext cx="5004308" cy="3535652"/>
+            <a:off x="1748715" y="1017725"/>
+            <a:ext cx="5646569" cy="3927730"/>
           </a:xfrm>
           <a:prstGeom prst="rect">
             <a:avLst/>
@@ -8402,6 +8571,217 @@
 </file>
 
 <file path=ppt/slides/slide7.xml><?xml version="1.0" encoding="utf-8"?>
+<p:sld xmlns:a="http://schemas.openxmlformats.org/drawingml/2006/main" xmlns:r="http://schemas.openxmlformats.org/officeDocument/2006/relationships" xmlns:p="http://schemas.openxmlformats.org/presentationml/2006/main">
+  <p:cSld>
+    <p:spTree>
+      <p:nvGrpSpPr>
+        <p:cNvPr id="1" name="Shape 96"/>
+        <p:cNvGrpSpPr/>
+        <p:nvPr/>
+      </p:nvGrpSpPr>
+      <p:grpSpPr>
+        <a:xfrm>
+          <a:off x="0" y="0"/>
+          <a:ext cx="0" cy="0"/>
+          <a:chOff x="0" y="0"/>
+          <a:chExt cx="0" cy="0"/>
+        </a:xfrm>
+      </p:grpSpPr>
+      <p:sp>
+        <p:nvSpPr>
+          <p:cNvPr id="97" name="Google Shape;97;p19"/>
+          <p:cNvSpPr txBox="1">
+            <a:spLocks noGrp="1"/>
+          </p:cNvSpPr>
+          <p:nvPr>
+            <p:ph type="title"/>
+          </p:nvPr>
+        </p:nvSpPr>
+        <p:spPr>
+          <a:prstGeom prst="rect">
+            <a:avLst/>
+          </a:prstGeom>
+        </p:spPr>
+        <p:txBody>
+          <a:bodyPr spcFirstLastPara="1" wrap="square" lIns="91425" tIns="91425" rIns="91425" bIns="91425" anchor="t" anchorCtr="0">
+            <a:noAutofit/>
+          </a:bodyPr>
+          <a:lstStyle/>
+          <a:p>
+            <a:pPr marL="0" lvl="0" indent="0" algn="l" rtl="0">
+              <a:spcBef>
+                <a:spcPts val="0"/>
+              </a:spcBef>
+              <a:spcAft>
+                <a:spcPts val="0"/>
+              </a:spcAft>
+              <a:buNone/>
+            </a:pPr>
+            <a:r>
+              <a:rPr lang="en" dirty="0"/>
+              <a:t>State Wise U.S. Wildfire Scenarios</a:t>
+            </a:r>
+            <a:endParaRPr dirty="0"/>
+          </a:p>
+        </p:txBody>
+      </p:sp>
+      <p:pic>
+        <p:nvPicPr>
+          <p:cNvPr id="10" name="Picture 9" descr="Map&#10;&#10;Description automatically generated">
+            <a:extLst>
+              <a:ext uri="{FF2B5EF4-FFF2-40B4-BE49-F238E27FC236}">
+                <a16:creationId xmlns:a16="http://schemas.microsoft.com/office/drawing/2014/main" id="{2AF8382E-E5B0-FD44-8FF8-341AD00BD473}"/>
+              </a:ext>
+            </a:extLst>
+          </p:cNvPr>
+          <p:cNvPicPr>
+            <a:picLocks noChangeAspect="1"/>
+          </p:cNvPicPr>
+          <p:nvPr/>
+        </p:nvPicPr>
+        <p:blipFill>
+          <a:blip r:embed="rId3"/>
+          <a:stretch>
+            <a:fillRect/>
+          </a:stretch>
+        </p:blipFill>
+        <p:spPr>
+          <a:xfrm>
+            <a:off x="311700" y="1017725"/>
+            <a:ext cx="6746148" cy="3728949"/>
+          </a:xfrm>
+          <a:prstGeom prst="rect">
+            <a:avLst/>
+          </a:prstGeom>
+        </p:spPr>
+      </p:pic>
+      <p:pic>
+        <p:nvPicPr>
+          <p:cNvPr id="12" name="Picture 11">
+            <a:extLst>
+              <a:ext uri="{FF2B5EF4-FFF2-40B4-BE49-F238E27FC236}">
+                <a16:creationId xmlns:a16="http://schemas.microsoft.com/office/drawing/2014/main" id="{3DF04DF9-D7FE-A54C-B2ED-47936CA50B18}"/>
+              </a:ext>
+            </a:extLst>
+          </p:cNvPr>
+          <p:cNvPicPr>
+            <a:picLocks noChangeAspect="1"/>
+          </p:cNvPicPr>
+          <p:nvPr/>
+        </p:nvPicPr>
+        <p:blipFill>
+          <a:blip r:embed="rId4"/>
+          <a:stretch>
+            <a:fillRect/>
+          </a:stretch>
+        </p:blipFill>
+        <p:spPr>
+          <a:xfrm>
+            <a:off x="7084490" y="1985168"/>
+            <a:ext cx="2059510" cy="1794063"/>
+          </a:xfrm>
+          <a:prstGeom prst="rect">
+            <a:avLst/>
+          </a:prstGeom>
+        </p:spPr>
+      </p:pic>
+    </p:spTree>
+  </p:cSld>
+  <p:clrMapOvr>
+    <a:masterClrMapping/>
+  </p:clrMapOvr>
+</p:sld>
+</file>
+
+<file path=ppt/slides/slide8.xml><?xml version="1.0" encoding="utf-8"?>
+<p:sld xmlns:a="http://schemas.openxmlformats.org/drawingml/2006/main" xmlns:r="http://schemas.openxmlformats.org/officeDocument/2006/relationships" xmlns:p="http://schemas.openxmlformats.org/presentationml/2006/main">
+  <p:cSld>
+    <p:spTree>
+      <p:nvGrpSpPr>
+        <p:cNvPr id="1" name=""/>
+        <p:cNvGrpSpPr/>
+        <p:nvPr/>
+      </p:nvGrpSpPr>
+      <p:grpSpPr>
+        <a:xfrm>
+          <a:off x="0" y="0"/>
+          <a:ext cx="0" cy="0"/>
+          <a:chOff x="0" y="0"/>
+          <a:chExt cx="0" cy="0"/>
+        </a:xfrm>
+      </p:grpSpPr>
+      <p:sp>
+        <p:nvSpPr>
+          <p:cNvPr id="2" name="Title 1">
+            <a:extLst>
+              <a:ext uri="{FF2B5EF4-FFF2-40B4-BE49-F238E27FC236}">
+                <a16:creationId xmlns:a16="http://schemas.microsoft.com/office/drawing/2014/main" id="{400B4761-9922-1243-8744-E073DD9FD229}"/>
+              </a:ext>
+            </a:extLst>
+          </p:cNvPr>
+          <p:cNvSpPr>
+            <a:spLocks noGrp="1"/>
+          </p:cNvSpPr>
+          <p:nvPr>
+            <p:ph type="title"/>
+          </p:nvPr>
+        </p:nvSpPr>
+        <p:spPr/>
+        <p:txBody>
+          <a:bodyPr/>
+          <a:lstStyle/>
+          <a:p>
+            <a:r>
+              <a:rPr lang="en-US" dirty="0"/>
+              <a:t>County Wise in California State</a:t>
+            </a:r>
+          </a:p>
+        </p:txBody>
+      </p:sp>
+      <p:pic>
+        <p:nvPicPr>
+          <p:cNvPr id="8" name="Picture 7" descr="Surface chart&#10;&#10;Description automatically generated with low confidence">
+            <a:extLst>
+              <a:ext uri="{FF2B5EF4-FFF2-40B4-BE49-F238E27FC236}">
+                <a16:creationId xmlns:a16="http://schemas.microsoft.com/office/drawing/2014/main" id="{41F335E2-9A6E-244B-BF16-B450651DDC13}"/>
+              </a:ext>
+            </a:extLst>
+          </p:cNvPr>
+          <p:cNvPicPr>
+            <a:picLocks noChangeAspect="1"/>
+          </p:cNvPicPr>
+          <p:nvPr/>
+        </p:nvPicPr>
+        <p:blipFill>
+          <a:blip r:embed="rId2"/>
+          <a:stretch>
+            <a:fillRect/>
+          </a:stretch>
+        </p:blipFill>
+        <p:spPr>
+          <a:xfrm>
+            <a:off x="2796785" y="1017725"/>
+            <a:ext cx="3550429" cy="3879850"/>
+          </a:xfrm>
+          <a:prstGeom prst="rect">
+            <a:avLst/>
+          </a:prstGeom>
+        </p:spPr>
+      </p:pic>
+    </p:spTree>
+    <p:extLst>
+      <p:ext uri="{BB962C8B-B14F-4D97-AF65-F5344CB8AC3E}">
+        <p14:creationId xmlns:p14="http://schemas.microsoft.com/office/powerpoint/2010/main" val="1119735463"/>
+      </p:ext>
+    </p:extLst>
+  </p:cSld>
+  <p:clrMapOvr>
+    <a:masterClrMapping/>
+  </p:clrMapOvr>
+</p:sld>
+</file>
+
+<file path=ppt/slides/slide9.xml><?xml version="1.0" encoding="utf-8"?>
 <p:sld xmlns:a="http://schemas.openxmlformats.org/drawingml/2006/main" xmlns:r="http://schemas.openxmlformats.org/officeDocument/2006/relationships" xmlns:p="http://schemas.openxmlformats.org/presentationml/2006/main">
   <p:cSld>
     <p:spTree>
@@ -8484,7 +8864,7 @@
         </p:nvSpPr>
         <p:spPr>
           <a:xfrm>
-            <a:off x="706764" y="1887057"/>
+            <a:off x="623400" y="863550"/>
             <a:ext cx="8520600" cy="3416400"/>
           </a:xfrm>
           <a:prstGeom prst="rect">
@@ -8497,22 +8877,31 @@
           </a:bodyPr>
           <a:lstStyle/>
           <a:p>
-            <a:pPr marL="457200" lvl="0" indent="-368300" algn="l" rtl="0">
+            <a:pPr indent="-368300">
               <a:lnSpc>
                 <a:spcPct val="150000"/>
               </a:lnSpc>
-              <a:spcBef>
-                <a:spcPts val="0"/>
-              </a:spcBef>
-              <a:spcAft>
-                <a:spcPts val="0"/>
-              </a:spcAft>
               <a:buSzPts val="2200"/>
+              <a:buFont typeface="Average"/>
               <a:buAutoNum type="arabicPeriod"/>
             </a:pPr>
             <a:r>
               <a:rPr lang="en-US" sz="2200" dirty="0"/>
-              <a:t>Conclusion 1</a:t>
+              <a:t>The # of wildfires has not increased over time.</a:t>
+            </a:r>
+          </a:p>
+          <a:p>
+            <a:pPr indent="-368300">
+              <a:lnSpc>
+                <a:spcPct val="150000"/>
+              </a:lnSpc>
+              <a:buSzPts val="2200"/>
+              <a:buFont typeface="Average"/>
+              <a:buAutoNum type="arabicPeriod"/>
+            </a:pPr>
+            <a:r>
+              <a:rPr lang="en-US" sz="2200" dirty="0"/>
+              <a:t>The # of acres burned has steadily increased, indicating the severity of the fires has gotten worse over time. </a:t>
             </a:r>
           </a:p>
           <a:p>
@@ -8525,289 +8914,40 @@
             </a:pPr>
             <a:r>
               <a:rPr lang="en-US" sz="2200" dirty="0"/>
-              <a:t>Conclusion 2</a:t>
+              <a:t>From June to September is the peak of wildfire all year round.</a:t>
             </a:r>
           </a:p>
           <a:p>
-            <a:pPr lvl="0" indent="-368300">
+            <a:pPr indent="-368300">
               <a:lnSpc>
                 <a:spcPct val="150000"/>
               </a:lnSpc>
               <a:buSzPts val="2200"/>
+              <a:buFont typeface="Average"/>
               <a:buAutoNum type="arabicPeriod"/>
             </a:pPr>
             <a:r>
               <a:rPr lang="en-US" sz="2200" dirty="0"/>
-              <a:t>Conclusion 3</a:t>
+              <a:t>Western U.S. is relatively riskier for wildfires such as California, Idaho, and Texas. </a:t>
             </a:r>
           </a:p>
           <a:p>
-            <a:pPr marL="0" lvl="0" indent="0" algn="l" rtl="0">
+            <a:pPr indent="-368300">
               <a:lnSpc>
                 <a:spcPct val="150000"/>
               </a:lnSpc>
-              <a:spcBef>
-                <a:spcPts val="1600"/>
-              </a:spcBef>
-              <a:spcAft>
-                <a:spcPts val="0"/>
-              </a:spcAft>
-              <a:buNone/>
+              <a:buSzPts val="2200"/>
+              <a:buFont typeface="Average"/>
+              <a:buAutoNum type="arabicPeriod"/>
             </a:pPr>
-            <a:endParaRPr sz="1700" dirty="0"/>
-          </a:p>
-          <a:p>
-            <a:pPr marL="0" lvl="0" indent="0" algn="l" rtl="0">
-              <a:lnSpc>
-                <a:spcPct val="150000"/>
-              </a:lnSpc>
-              <a:spcBef>
-                <a:spcPts val="1600"/>
-              </a:spcBef>
-              <a:spcAft>
-                <a:spcPts val="0"/>
-              </a:spcAft>
-              <a:buNone/>
-            </a:pPr>
-            <a:endParaRPr sz="1700" dirty="0"/>
-          </a:p>
-          <a:p>
-            <a:pPr marL="0" lvl="0" indent="0" algn="l" rtl="0">
-              <a:lnSpc>
-                <a:spcPct val="150000"/>
-              </a:lnSpc>
-              <a:spcBef>
-                <a:spcPts val="1600"/>
-              </a:spcBef>
-              <a:spcAft>
-                <a:spcPts val="1600"/>
-              </a:spcAft>
-              <a:buNone/>
-            </a:pPr>
+            <a:r>
+              <a:rPr lang="en-US" sz="2200" dirty="0"/>
+              <a:t>Alaska has the most Acres burned, but it is not risky due to the limited population</a:t>
+            </a:r>
             <a:endParaRPr sz="1700" dirty="0"/>
           </a:p>
         </p:txBody>
       </p:sp>
-    </p:spTree>
-  </p:cSld>
-  <p:clrMapOvr>
-    <a:masterClrMapping/>
-  </p:clrMapOvr>
-</p:sld>
-</file>
-
-<file path=ppt/slides/slide8.xml><?xml version="1.0" encoding="utf-8"?>
-<p:sld xmlns:a="http://schemas.openxmlformats.org/drawingml/2006/main" xmlns:r="http://schemas.openxmlformats.org/officeDocument/2006/relationships" xmlns:p="http://schemas.openxmlformats.org/presentationml/2006/main">
-  <p:cSld>
-    <p:spTree>
-      <p:nvGrpSpPr>
-        <p:cNvPr id="1" name="Shape 108"/>
-        <p:cNvGrpSpPr/>
-        <p:nvPr/>
-      </p:nvGrpSpPr>
-      <p:grpSpPr>
-        <a:xfrm>
-          <a:off x="0" y="0"/>
-          <a:ext cx="0" cy="0"/>
-          <a:chOff x="0" y="0"/>
-          <a:chExt cx="0" cy="0"/>
-        </a:xfrm>
-      </p:grpSpPr>
-      <p:sp>
-        <p:nvSpPr>
-          <p:cNvPr id="109" name="Google Shape;109;p21"/>
-          <p:cNvSpPr txBox="1">
-            <a:spLocks noGrp="1"/>
-          </p:cNvSpPr>
-          <p:nvPr>
-            <p:ph type="title"/>
-          </p:nvPr>
-        </p:nvSpPr>
-        <p:spPr>
-          <a:prstGeom prst="rect">
-            <a:avLst/>
-          </a:prstGeom>
-        </p:spPr>
-        <p:txBody>
-          <a:bodyPr spcFirstLastPara="1" wrap="square" lIns="91425" tIns="91425" rIns="91425" bIns="91425" anchor="t" anchorCtr="0">
-            <a:noAutofit/>
-          </a:bodyPr>
-          <a:lstStyle/>
-          <a:p>
-            <a:pPr marL="0" lvl="0" indent="0" algn="l" rtl="0">
-              <a:spcBef>
-                <a:spcPts val="0"/>
-              </a:spcBef>
-              <a:spcAft>
-                <a:spcPts val="0"/>
-              </a:spcAft>
-              <a:buNone/>
-            </a:pPr>
-            <a:r>
-              <a:rPr lang="en" dirty="0"/>
-              <a:t>U.S. Wildfire Size Classification Scenarios</a:t>
-            </a:r>
-            <a:endParaRPr dirty="0"/>
-          </a:p>
-        </p:txBody>
-      </p:sp>
-      <p:pic>
-        <p:nvPicPr>
-          <p:cNvPr id="3" name="Picture 2" descr="Chart, bar chart&#10;&#10;Description automatically generated">
-            <a:extLst>
-              <a:ext uri="{FF2B5EF4-FFF2-40B4-BE49-F238E27FC236}">
-                <a16:creationId xmlns:a16="http://schemas.microsoft.com/office/drawing/2014/main" id="{E6CB5E82-1702-0C44-89BF-CE4F07EA6FD0}"/>
-              </a:ext>
-            </a:extLst>
-          </p:cNvPr>
-          <p:cNvPicPr>
-            <a:picLocks noChangeAspect="1"/>
-          </p:cNvPicPr>
-          <p:nvPr/>
-        </p:nvPicPr>
-        <p:blipFill>
-          <a:blip r:embed="rId3"/>
-          <a:stretch>
-            <a:fillRect/>
-          </a:stretch>
-        </p:blipFill>
-        <p:spPr>
-          <a:xfrm>
-            <a:off x="2128745" y="1195832"/>
-            <a:ext cx="4886509" cy="3421888"/>
-          </a:xfrm>
-          <a:prstGeom prst="rect">
-            <a:avLst/>
-          </a:prstGeom>
-        </p:spPr>
-      </p:pic>
-    </p:spTree>
-  </p:cSld>
-  <p:clrMapOvr>
-    <a:masterClrMapping/>
-  </p:clrMapOvr>
-</p:sld>
-</file>
-
-<file path=ppt/slides/slide9.xml><?xml version="1.0" encoding="utf-8"?>
-<p:sld xmlns:a="http://schemas.openxmlformats.org/drawingml/2006/main" xmlns:r="http://schemas.openxmlformats.org/officeDocument/2006/relationships" xmlns:p="http://schemas.openxmlformats.org/presentationml/2006/main">
-  <p:cSld>
-    <p:spTree>
-      <p:nvGrpSpPr>
-        <p:cNvPr id="1" name="Shape 120"/>
-        <p:cNvGrpSpPr/>
-        <p:nvPr/>
-      </p:nvGrpSpPr>
-      <p:grpSpPr>
-        <a:xfrm>
-          <a:off x="0" y="0"/>
-          <a:ext cx="0" cy="0"/>
-          <a:chOff x="0" y="0"/>
-          <a:chExt cx="0" cy="0"/>
-        </a:xfrm>
-      </p:grpSpPr>
-      <p:sp>
-        <p:nvSpPr>
-          <p:cNvPr id="121" name="Google Shape;121;p23"/>
-          <p:cNvSpPr txBox="1">
-            <a:spLocks noGrp="1"/>
-          </p:cNvSpPr>
-          <p:nvPr>
-            <p:ph type="title"/>
-          </p:nvPr>
-        </p:nvSpPr>
-        <p:spPr>
-          <a:xfrm>
-            <a:off x="311700" y="445025"/>
-            <a:ext cx="8520600" cy="572700"/>
-          </a:xfrm>
-          <a:prstGeom prst="rect">
-            <a:avLst/>
-          </a:prstGeom>
-        </p:spPr>
-        <p:txBody>
-          <a:bodyPr spcFirstLastPara="1" wrap="square" lIns="91425" tIns="91425" rIns="91425" bIns="91425" anchor="t" anchorCtr="0">
-            <a:noAutofit/>
-          </a:bodyPr>
-          <a:lstStyle/>
-          <a:p>
-            <a:pPr marL="0" lvl="0" indent="0" algn="l" rtl="0">
-              <a:spcBef>
-                <a:spcPts val="0"/>
-              </a:spcBef>
-              <a:spcAft>
-                <a:spcPts val="0"/>
-              </a:spcAft>
-              <a:buNone/>
-            </a:pPr>
-            <a:r>
-              <a:rPr lang="en" dirty="0"/>
-              <a:t>U.S. Wildfire Cause Distribution of Year</a:t>
-            </a:r>
-            <a:endParaRPr dirty="0"/>
-          </a:p>
-        </p:txBody>
-      </p:sp>
-      <p:pic>
-        <p:nvPicPr>
-          <p:cNvPr id="5" name="Picture 4" descr="Chart, funnel chart&#10;&#10;Description automatically generated">
-            <a:extLst>
-              <a:ext uri="{FF2B5EF4-FFF2-40B4-BE49-F238E27FC236}">
-                <a16:creationId xmlns:a16="http://schemas.microsoft.com/office/drawing/2014/main" id="{486A407F-4840-F744-AEFD-D45B82153B5E}"/>
-              </a:ext>
-            </a:extLst>
-          </p:cNvPr>
-          <p:cNvPicPr>
-            <a:picLocks noChangeAspect="1"/>
-          </p:cNvPicPr>
-          <p:nvPr/>
-        </p:nvPicPr>
-        <p:blipFill>
-          <a:blip r:embed="rId3"/>
-          <a:stretch>
-            <a:fillRect/>
-          </a:stretch>
-        </p:blipFill>
-        <p:spPr>
-          <a:xfrm>
-            <a:off x="3895344" y="1075866"/>
-            <a:ext cx="5099050" cy="3622609"/>
-          </a:xfrm>
-          <a:prstGeom prst="rect">
-            <a:avLst/>
-          </a:prstGeom>
-        </p:spPr>
-      </p:pic>
-      <p:pic>
-        <p:nvPicPr>
-          <p:cNvPr id="7" name="Picture 6" descr="Chart, pie chart&#10;&#10;Description automatically generated">
-            <a:extLst>
-              <a:ext uri="{FF2B5EF4-FFF2-40B4-BE49-F238E27FC236}">
-                <a16:creationId xmlns:a16="http://schemas.microsoft.com/office/drawing/2014/main" id="{47B96223-20C2-2C49-960B-E52C562EECF2}"/>
-              </a:ext>
-            </a:extLst>
-          </p:cNvPr>
-          <p:cNvPicPr>
-            <a:picLocks noChangeAspect="1"/>
-          </p:cNvPicPr>
-          <p:nvPr/>
-        </p:nvPicPr>
-        <p:blipFill>
-          <a:blip r:embed="rId4"/>
-          <a:stretch>
-            <a:fillRect/>
-          </a:stretch>
-        </p:blipFill>
-        <p:spPr>
-          <a:xfrm>
-            <a:off x="149606" y="1709928"/>
-            <a:ext cx="3611211" cy="2011680"/>
-          </a:xfrm>
-          <a:prstGeom prst="rect">
-            <a:avLst/>
-          </a:prstGeom>
-        </p:spPr>
-      </p:pic>
     </p:spTree>
   </p:cSld>
   <p:clrMapOvr>

</xml_diff>